<commit_message>
first set of changes
</commit_message>
<xml_diff>
--- a/docs/images/sponsors.pptx
+++ b/docs/images/sponsors.pptx
@@ -104,6 +104,11 @@
       </a:defRPr>
     </a:lvl9pPr>
   </p:defaultTextStyle>
+  <p:extLst>
+    <p:ext uri="{EFAFB233-063F-42B5-8137-9DF3F51BA10A}">
+      <p15:sldGuideLst xmlns:p15="http://schemas.microsoft.com/office/powerpoint/2012/main"/>
+    </p:ext>
+  </p:extLst>
 </p:presentation>
 </file>
 
@@ -254,7 +259,7 @@
           <a:p>
             <a:fld id="{0231A3BF-02FE-42AD-9563-0DE589E5EF61}" type="datetimeFigureOut">
               <a:rPr lang="en-US" smtClean="0"/>
-              <a:t>6/4/2021</a:t>
+              <a:t>1/28/23</a:t>
             </a:fld>
             <a:endParaRPr lang="en-US"/>
           </a:p>
@@ -452,7 +457,7 @@
           <a:p>
             <a:fld id="{0231A3BF-02FE-42AD-9563-0DE589E5EF61}" type="datetimeFigureOut">
               <a:rPr lang="en-US" smtClean="0"/>
-              <a:t>6/4/2021</a:t>
+              <a:t>1/28/23</a:t>
             </a:fld>
             <a:endParaRPr lang="en-US"/>
           </a:p>
@@ -660,7 +665,7 @@
           <a:p>
             <a:fld id="{0231A3BF-02FE-42AD-9563-0DE589E5EF61}" type="datetimeFigureOut">
               <a:rPr lang="en-US" smtClean="0"/>
-              <a:t>6/4/2021</a:t>
+              <a:t>1/28/23</a:t>
             </a:fld>
             <a:endParaRPr lang="en-US"/>
           </a:p>
@@ -858,7 +863,7 @@
           <a:p>
             <a:fld id="{0231A3BF-02FE-42AD-9563-0DE589E5EF61}" type="datetimeFigureOut">
               <a:rPr lang="en-US" smtClean="0"/>
-              <a:t>6/4/2021</a:t>
+              <a:t>1/28/23</a:t>
             </a:fld>
             <a:endParaRPr lang="en-US"/>
           </a:p>
@@ -1133,7 +1138,7 @@
           <a:p>
             <a:fld id="{0231A3BF-02FE-42AD-9563-0DE589E5EF61}" type="datetimeFigureOut">
               <a:rPr lang="en-US" smtClean="0"/>
-              <a:t>6/4/2021</a:t>
+              <a:t>1/28/23</a:t>
             </a:fld>
             <a:endParaRPr lang="en-US"/>
           </a:p>
@@ -1398,7 +1403,7 @@
           <a:p>
             <a:fld id="{0231A3BF-02FE-42AD-9563-0DE589E5EF61}" type="datetimeFigureOut">
               <a:rPr lang="en-US" smtClean="0"/>
-              <a:t>6/4/2021</a:t>
+              <a:t>1/28/23</a:t>
             </a:fld>
             <a:endParaRPr lang="en-US"/>
           </a:p>
@@ -1810,7 +1815,7 @@
           <a:p>
             <a:fld id="{0231A3BF-02FE-42AD-9563-0DE589E5EF61}" type="datetimeFigureOut">
               <a:rPr lang="en-US" smtClean="0"/>
-              <a:t>6/4/2021</a:t>
+              <a:t>1/28/23</a:t>
             </a:fld>
             <a:endParaRPr lang="en-US"/>
           </a:p>
@@ -1951,7 +1956,7 @@
           <a:p>
             <a:fld id="{0231A3BF-02FE-42AD-9563-0DE589E5EF61}" type="datetimeFigureOut">
               <a:rPr lang="en-US" smtClean="0"/>
-              <a:t>6/4/2021</a:t>
+              <a:t>1/28/23</a:t>
             </a:fld>
             <a:endParaRPr lang="en-US"/>
           </a:p>
@@ -2064,7 +2069,7 @@
           <a:p>
             <a:fld id="{0231A3BF-02FE-42AD-9563-0DE589E5EF61}" type="datetimeFigureOut">
               <a:rPr lang="en-US" smtClean="0"/>
-              <a:t>6/4/2021</a:t>
+              <a:t>1/28/23</a:t>
             </a:fld>
             <a:endParaRPr lang="en-US"/>
           </a:p>
@@ -2375,7 +2380,7 @@
           <a:p>
             <a:fld id="{0231A3BF-02FE-42AD-9563-0DE589E5EF61}" type="datetimeFigureOut">
               <a:rPr lang="en-US" smtClean="0"/>
-              <a:t>6/4/2021</a:t>
+              <a:t>1/28/23</a:t>
             </a:fld>
             <a:endParaRPr lang="en-US"/>
           </a:p>
@@ -2663,7 +2668,7 @@
           <a:p>
             <a:fld id="{0231A3BF-02FE-42AD-9563-0DE589E5EF61}" type="datetimeFigureOut">
               <a:rPr lang="en-US" smtClean="0"/>
-              <a:t>6/4/2021</a:t>
+              <a:t>1/28/23</a:t>
             </a:fld>
             <a:endParaRPr lang="en-US"/>
           </a:p>
@@ -2904,7 +2909,7 @@
           <a:p>
             <a:fld id="{0231A3BF-02FE-42AD-9563-0DE589E5EF61}" type="datetimeFigureOut">
               <a:rPr lang="en-US" smtClean="0"/>
-              <a:t>6/4/2021</a:t>
+              <a:t>1/28/23</a:t>
             </a:fld>
             <a:endParaRPr lang="en-US"/>
           </a:p>
@@ -3350,8 +3355,8 @@
         </p:blipFill>
         <p:spPr bwMode="auto">
           <a:xfrm>
-            <a:off x="2007079" y="2711210"/>
-            <a:ext cx="3273414" cy="1653756"/>
+            <a:off x="8815776" y="593831"/>
+            <a:ext cx="3118433" cy="1575458"/>
           </a:xfrm>
           <a:prstGeom prst="rect">
             <a:avLst/>
@@ -3370,10 +3375,46 @@
       </p:pic>
       <p:pic>
         <p:nvPicPr>
-          <p:cNvPr id="1028" name="Picture 4" descr="EuroMarine logo | Euromarine Network">
-            <a:extLst>
-              <a:ext uri="{FF2B5EF4-FFF2-40B4-BE49-F238E27FC236}">
-                <a16:creationId xmlns:a16="http://schemas.microsoft.com/office/drawing/2014/main" id="{8B22D344-E43F-4211-B025-765F62C9966B}"/>
+          <p:cNvPr id="3" name="Picture 2">
+            <a:extLst>
+              <a:ext uri="{FF2B5EF4-FFF2-40B4-BE49-F238E27FC236}">
+                <a16:creationId xmlns:a16="http://schemas.microsoft.com/office/drawing/2014/main" id="{F65E0FDF-2602-3D8B-2E69-51EADCEEC841}"/>
+              </a:ext>
+            </a:extLst>
+          </p:cNvPr>
+          <p:cNvPicPr>
+            <a:picLocks noChangeAspect="1"/>
+          </p:cNvPicPr>
+          <p:nvPr/>
+        </p:nvPicPr>
+        <p:blipFill>
+          <a:blip r:embed="rId3">
+            <a:extLst>
+              <a:ext uri="{28A0092B-C50C-407E-A947-70E740481C1C}">
+                <a14:useLocalDpi xmlns:a14="http://schemas.microsoft.com/office/drawing/2010/main" val="0"/>
+              </a:ext>
+            </a:extLst>
+          </a:blip>
+          <a:stretch>
+            <a:fillRect/>
+          </a:stretch>
+        </p:blipFill>
+        <p:spPr>
+          <a:xfrm>
+            <a:off x="472611" y="305292"/>
+            <a:ext cx="2232425" cy="2232425"/>
+          </a:xfrm>
+          <a:prstGeom prst="rect">
+            <a:avLst/>
+          </a:prstGeom>
+        </p:spPr>
+      </p:pic>
+      <p:pic>
+        <p:nvPicPr>
+          <p:cNvPr id="4" name="Picture 2" descr="Symbols of NASA | NASA">
+            <a:extLst>
+              <a:ext uri="{FF2B5EF4-FFF2-40B4-BE49-F238E27FC236}">
+                <a16:creationId xmlns:a16="http://schemas.microsoft.com/office/drawing/2014/main" id="{61BE8ABC-F901-D551-912E-35BE7045C7C8}"/>
               </a:ext>
             </a:extLst>
           </p:cNvPr>
@@ -3383,7 +3424,7 @@
           <p:nvPr/>
         </p:nvPicPr>
         <p:blipFill>
-          <a:blip r:embed="rId3">
+          <a:blip r:embed="rId4">
             <a:extLst>
               <a:ext uri="{28A0092B-C50C-407E-A947-70E740481C1C}">
                 <a14:useLocalDpi xmlns:a14="http://schemas.microsoft.com/office/drawing/2010/main" val="0"/>
@@ -3397,8 +3438,8 @@
         </p:blipFill>
         <p:spPr bwMode="auto">
           <a:xfrm>
-            <a:off x="6556705" y="2711210"/>
-            <a:ext cx="2943225" cy="1552575"/>
+            <a:off x="811668" y="2785613"/>
+            <a:ext cx="5174504" cy="2587252"/>
           </a:xfrm>
           <a:prstGeom prst="rect">
             <a:avLst/>
@@ -3413,6 +3454,230 @@
               </a14:hiddenFill>
             </a:ext>
           </a:extLst>
+        </p:spPr>
+      </p:pic>
+      <p:pic>
+        <p:nvPicPr>
+          <p:cNvPr id="1030" name="Picture 6">
+            <a:extLst>
+              <a:ext uri="{FF2B5EF4-FFF2-40B4-BE49-F238E27FC236}">
+                <a16:creationId xmlns:a16="http://schemas.microsoft.com/office/drawing/2014/main" id="{F82BC988-ADD3-0575-DED0-C9E55ED00638}"/>
+              </a:ext>
+            </a:extLst>
+          </p:cNvPr>
+          <p:cNvPicPr>
+            <a:picLocks noChangeAspect="1" noChangeArrowheads="1"/>
+          </p:cNvPicPr>
+          <p:nvPr/>
+        </p:nvPicPr>
+        <p:blipFill>
+          <a:blip r:embed="rId5">
+            <a:extLst>
+              <a:ext uri="{28A0092B-C50C-407E-A947-70E740481C1C}">
+                <a14:useLocalDpi xmlns:a14="http://schemas.microsoft.com/office/drawing/2010/main" val="0"/>
+              </a:ext>
+            </a:extLst>
+          </a:blip>
+          <a:srcRect/>
+          <a:stretch>
+            <a:fillRect/>
+          </a:stretch>
+        </p:blipFill>
+        <p:spPr bwMode="auto">
+          <a:xfrm>
+            <a:off x="5266981" y="2988037"/>
+            <a:ext cx="2182403" cy="2182403"/>
+          </a:xfrm>
+          <a:prstGeom prst="rect">
+            <a:avLst/>
+          </a:prstGeom>
+          <a:noFill/>
+          <a:extLst>
+            <a:ext uri="{909E8E84-426E-40DD-AFC4-6F175D3DCCD1}">
+              <a14:hiddenFill xmlns:a14="http://schemas.microsoft.com/office/drawing/2010/main">
+                <a:solidFill>
+                  <a:srgbClr val="FFFFFF"/>
+                </a:solidFill>
+              </a14:hiddenFill>
+            </a:ext>
+          </a:extLst>
+        </p:spPr>
+      </p:pic>
+      <p:pic>
+        <p:nvPicPr>
+          <p:cNvPr id="1034" name="Picture 10" descr="NOAA AOML Logo - ANGARI Foundation">
+            <a:extLst>
+              <a:ext uri="{FF2B5EF4-FFF2-40B4-BE49-F238E27FC236}">
+                <a16:creationId xmlns:a16="http://schemas.microsoft.com/office/drawing/2014/main" id="{0450E7BE-AE1F-F24B-5CA7-17043F70F426}"/>
+              </a:ext>
+            </a:extLst>
+          </p:cNvPr>
+          <p:cNvPicPr>
+            <a:picLocks noChangeAspect="1" noChangeArrowheads="1"/>
+          </p:cNvPicPr>
+          <p:nvPr/>
+        </p:nvPicPr>
+        <p:blipFill>
+          <a:blip r:embed="rId6">
+            <a:extLst>
+              <a:ext uri="{28A0092B-C50C-407E-A947-70E740481C1C}">
+                <a14:useLocalDpi xmlns:a14="http://schemas.microsoft.com/office/drawing/2010/main" val="0"/>
+              </a:ext>
+            </a:extLst>
+          </a:blip>
+          <a:srcRect/>
+          <a:stretch>
+            <a:fillRect/>
+          </a:stretch>
+        </p:blipFill>
+        <p:spPr bwMode="auto">
+          <a:xfrm>
+            <a:off x="8065965" y="2850610"/>
+            <a:ext cx="2468226" cy="2457256"/>
+          </a:xfrm>
+          <a:prstGeom prst="rect">
+            <a:avLst/>
+          </a:prstGeom>
+          <a:noFill/>
+          <a:extLst>
+            <a:ext uri="{909E8E84-426E-40DD-AFC4-6F175D3DCCD1}">
+              <a14:hiddenFill xmlns:a14="http://schemas.microsoft.com/office/drawing/2010/main">
+                <a:solidFill>
+                  <a:srgbClr val="FFFFFF"/>
+                </a:solidFill>
+              </a14:hiddenFill>
+            </a:ext>
+          </a:extLst>
+        </p:spPr>
+      </p:pic>
+      <p:pic>
+        <p:nvPicPr>
+          <p:cNvPr id="1036" name="Picture 12">
+            <a:extLst>
+              <a:ext uri="{FF2B5EF4-FFF2-40B4-BE49-F238E27FC236}">
+                <a16:creationId xmlns:a16="http://schemas.microsoft.com/office/drawing/2014/main" id="{B7D87A23-0C31-C76D-4ABE-5D51888F2EA3}"/>
+              </a:ext>
+            </a:extLst>
+          </p:cNvPr>
+          <p:cNvPicPr>
+            <a:picLocks noChangeAspect="1" noChangeArrowheads="1"/>
+          </p:cNvPicPr>
+          <p:nvPr/>
+        </p:nvPicPr>
+        <p:blipFill>
+          <a:blip r:embed="rId7">
+            <a:extLst>
+              <a:ext uri="{28A0092B-C50C-407E-A947-70E740481C1C}">
+                <a14:useLocalDpi xmlns:a14="http://schemas.microsoft.com/office/drawing/2010/main" val="0"/>
+              </a:ext>
+            </a:extLst>
+          </a:blip>
+          <a:srcRect/>
+          <a:stretch>
+            <a:fillRect/>
+          </a:stretch>
+        </p:blipFill>
+        <p:spPr bwMode="auto">
+          <a:xfrm>
+            <a:off x="2891922" y="393934"/>
+            <a:ext cx="3118432" cy="2244897"/>
+          </a:xfrm>
+          <a:prstGeom prst="rect">
+            <a:avLst/>
+          </a:prstGeom>
+          <a:noFill/>
+          <a:extLst>
+            <a:ext uri="{909E8E84-426E-40DD-AFC4-6F175D3DCCD1}">
+              <a14:hiddenFill xmlns:a14="http://schemas.microsoft.com/office/drawing/2010/main">
+                <a:solidFill>
+                  <a:srgbClr val="FFFFFF"/>
+                </a:solidFill>
+              </a14:hiddenFill>
+            </a:ext>
+          </a:extLst>
+        </p:spPr>
+      </p:pic>
+      <p:pic>
+        <p:nvPicPr>
+          <p:cNvPr id="1038" name="Picture 14" descr="Administración de Parques Nacionales - Wikipedia">
+            <a:extLst>
+              <a:ext uri="{FF2B5EF4-FFF2-40B4-BE49-F238E27FC236}">
+                <a16:creationId xmlns:a16="http://schemas.microsoft.com/office/drawing/2014/main" id="{7C438743-15A0-40F9-9942-894FA0EF9107}"/>
+              </a:ext>
+            </a:extLst>
+          </p:cNvPr>
+          <p:cNvPicPr>
+            <a:picLocks noChangeAspect="1" noChangeArrowheads="1"/>
+          </p:cNvPicPr>
+          <p:nvPr/>
+        </p:nvPicPr>
+        <p:blipFill>
+          <a:blip r:embed="rId8">
+            <a:extLst>
+              <a:ext uri="{28A0092B-C50C-407E-A947-70E740481C1C}">
+                <a14:useLocalDpi xmlns:a14="http://schemas.microsoft.com/office/drawing/2010/main" val="0"/>
+              </a:ext>
+            </a:extLst>
+          </a:blip>
+          <a:srcRect/>
+          <a:stretch>
+            <a:fillRect/>
+          </a:stretch>
+        </p:blipFill>
+        <p:spPr bwMode="auto">
+          <a:xfrm>
+            <a:off x="6181648" y="425181"/>
+            <a:ext cx="2182402" cy="2182402"/>
+          </a:xfrm>
+          <a:prstGeom prst="rect">
+            <a:avLst/>
+          </a:prstGeom>
+          <a:noFill/>
+          <a:extLst>
+            <a:ext uri="{909E8E84-426E-40DD-AFC4-6F175D3DCCD1}">
+              <a14:hiddenFill xmlns:a14="http://schemas.microsoft.com/office/drawing/2010/main">
+                <a:solidFill>
+                  <a:srgbClr val="FFFFFF"/>
+                </a:solidFill>
+              </a14:hiddenFill>
+            </a:ext>
+          </a:extLst>
+        </p:spPr>
+      </p:pic>
+      <p:pic>
+        <p:nvPicPr>
+          <p:cNvPr id="7" name="Picture 6">
+            <a:extLst>
+              <a:ext uri="{FF2B5EF4-FFF2-40B4-BE49-F238E27FC236}">
+                <a16:creationId xmlns:a16="http://schemas.microsoft.com/office/drawing/2014/main" id="{5445A52A-312B-E8B9-E52A-F411EDFD0B8B}"/>
+              </a:ext>
+            </a:extLst>
+          </p:cNvPr>
+          <p:cNvPicPr>
+            <a:picLocks noChangeAspect="1"/>
+          </p:cNvPicPr>
+          <p:nvPr/>
+        </p:nvPicPr>
+        <p:blipFill>
+          <a:blip r:embed="rId9">
+            <a:extLst>
+              <a:ext uri="{28A0092B-C50C-407E-A947-70E740481C1C}">
+                <a14:useLocalDpi xmlns:a14="http://schemas.microsoft.com/office/drawing/2010/main" val="0"/>
+              </a:ext>
+            </a:extLst>
+          </a:blip>
+          <a:stretch>
+            <a:fillRect/>
+          </a:stretch>
+        </p:blipFill>
+        <p:spPr>
+          <a:xfrm>
+            <a:off x="3582861" y="5688320"/>
+            <a:ext cx="5550642" cy="955583"/>
+          </a:xfrm>
+          <a:prstGeom prst="rect">
+            <a:avLst/>
+          </a:prstGeom>
         </p:spPr>
       </p:pic>
     </p:spTree>

</xml_diff>

<commit_message>
added "guardafaunas" and new logos
</commit_message>
<xml_diff>
--- a/docs/images/sponsors.pptx
+++ b/docs/images/sponsors.pptx
@@ -259,7 +259,7 @@
           <a:p>
             <a:fld id="{0231A3BF-02FE-42AD-9563-0DE589E5EF61}" type="datetimeFigureOut">
               <a:rPr lang="en-US" smtClean="0"/>
-              <a:t>1/28/23</a:t>
+              <a:t>3/16/23</a:t>
             </a:fld>
             <a:endParaRPr lang="en-US"/>
           </a:p>
@@ -457,7 +457,7 @@
           <a:p>
             <a:fld id="{0231A3BF-02FE-42AD-9563-0DE589E5EF61}" type="datetimeFigureOut">
               <a:rPr lang="en-US" smtClean="0"/>
-              <a:t>1/28/23</a:t>
+              <a:t>3/16/23</a:t>
             </a:fld>
             <a:endParaRPr lang="en-US"/>
           </a:p>
@@ -665,7 +665,7 @@
           <a:p>
             <a:fld id="{0231A3BF-02FE-42AD-9563-0DE589E5EF61}" type="datetimeFigureOut">
               <a:rPr lang="en-US" smtClean="0"/>
-              <a:t>1/28/23</a:t>
+              <a:t>3/16/23</a:t>
             </a:fld>
             <a:endParaRPr lang="en-US"/>
           </a:p>
@@ -863,7 +863,7 @@
           <a:p>
             <a:fld id="{0231A3BF-02FE-42AD-9563-0DE589E5EF61}" type="datetimeFigureOut">
               <a:rPr lang="en-US" smtClean="0"/>
-              <a:t>1/28/23</a:t>
+              <a:t>3/16/23</a:t>
             </a:fld>
             <a:endParaRPr lang="en-US"/>
           </a:p>
@@ -1138,7 +1138,7 @@
           <a:p>
             <a:fld id="{0231A3BF-02FE-42AD-9563-0DE589E5EF61}" type="datetimeFigureOut">
               <a:rPr lang="en-US" smtClean="0"/>
-              <a:t>1/28/23</a:t>
+              <a:t>3/16/23</a:t>
             </a:fld>
             <a:endParaRPr lang="en-US"/>
           </a:p>
@@ -1403,7 +1403,7 @@
           <a:p>
             <a:fld id="{0231A3BF-02FE-42AD-9563-0DE589E5EF61}" type="datetimeFigureOut">
               <a:rPr lang="en-US" smtClean="0"/>
-              <a:t>1/28/23</a:t>
+              <a:t>3/16/23</a:t>
             </a:fld>
             <a:endParaRPr lang="en-US"/>
           </a:p>
@@ -1815,7 +1815,7 @@
           <a:p>
             <a:fld id="{0231A3BF-02FE-42AD-9563-0DE589E5EF61}" type="datetimeFigureOut">
               <a:rPr lang="en-US" smtClean="0"/>
-              <a:t>1/28/23</a:t>
+              <a:t>3/16/23</a:t>
             </a:fld>
             <a:endParaRPr lang="en-US"/>
           </a:p>
@@ -1956,7 +1956,7 @@
           <a:p>
             <a:fld id="{0231A3BF-02FE-42AD-9563-0DE589E5EF61}" type="datetimeFigureOut">
               <a:rPr lang="en-US" smtClean="0"/>
-              <a:t>1/28/23</a:t>
+              <a:t>3/16/23</a:t>
             </a:fld>
             <a:endParaRPr lang="en-US"/>
           </a:p>
@@ -2069,7 +2069,7 @@
           <a:p>
             <a:fld id="{0231A3BF-02FE-42AD-9563-0DE589E5EF61}" type="datetimeFigureOut">
               <a:rPr lang="en-US" smtClean="0"/>
-              <a:t>1/28/23</a:t>
+              <a:t>3/16/23</a:t>
             </a:fld>
             <a:endParaRPr lang="en-US"/>
           </a:p>
@@ -2380,7 +2380,7 @@
           <a:p>
             <a:fld id="{0231A3BF-02FE-42AD-9563-0DE589E5EF61}" type="datetimeFigureOut">
               <a:rPr lang="en-US" smtClean="0"/>
-              <a:t>1/28/23</a:t>
+              <a:t>3/16/23</a:t>
             </a:fld>
             <a:endParaRPr lang="en-US"/>
           </a:p>
@@ -2668,7 +2668,7 @@
           <a:p>
             <a:fld id="{0231A3BF-02FE-42AD-9563-0DE589E5EF61}" type="datetimeFigureOut">
               <a:rPr lang="en-US" smtClean="0"/>
-              <a:t>1/28/23</a:t>
+              <a:t>3/16/23</a:t>
             </a:fld>
             <a:endParaRPr lang="en-US"/>
           </a:p>
@@ -2909,7 +2909,7 @@
           <a:p>
             <a:fld id="{0231A3BF-02FE-42AD-9563-0DE589E5EF61}" type="datetimeFigureOut">
               <a:rPr lang="en-US" smtClean="0"/>
-              <a:t>1/28/23</a:t>
+              <a:t>3/16/23</a:t>
             </a:fld>
             <a:endParaRPr lang="en-US"/>
           </a:p>
@@ -3355,8 +3355,8 @@
         </p:blipFill>
         <p:spPr bwMode="auto">
           <a:xfrm>
-            <a:off x="8815776" y="593831"/>
-            <a:ext cx="3118433" cy="1575458"/>
+            <a:off x="5137703" y="589881"/>
+            <a:ext cx="2424594" cy="1224925"/>
           </a:xfrm>
           <a:prstGeom prst="rect">
             <a:avLst/>
@@ -3401,8 +3401,8 @@
         </p:blipFill>
         <p:spPr>
           <a:xfrm>
-            <a:off x="472611" y="305292"/>
-            <a:ext cx="2232425" cy="2232425"/>
+            <a:off x="472612" y="305293"/>
+            <a:ext cx="1735720" cy="1735720"/>
           </a:xfrm>
           <a:prstGeom prst="rect">
             <a:avLst/>
@@ -3438,8 +3438,8 @@
         </p:blipFill>
         <p:spPr bwMode="auto">
           <a:xfrm>
-            <a:off x="811668" y="2785613"/>
-            <a:ext cx="5174504" cy="2587252"/>
+            <a:off x="0" y="2552377"/>
+            <a:ext cx="4221916" cy="2110958"/>
           </a:xfrm>
           <a:prstGeom prst="rect">
             <a:avLst/>
@@ -3485,8 +3485,8 @@
         </p:blipFill>
         <p:spPr bwMode="auto">
           <a:xfrm>
-            <a:off x="5266981" y="2988037"/>
-            <a:ext cx="2182403" cy="2182403"/>
+            <a:off x="2230436" y="4959544"/>
+            <a:ext cx="1780638" cy="1780638"/>
           </a:xfrm>
           <a:prstGeom prst="rect">
             <a:avLst/>
@@ -3532,8 +3532,8 @@
         </p:blipFill>
         <p:spPr bwMode="auto">
           <a:xfrm>
-            <a:off x="8065965" y="2850610"/>
-            <a:ext cx="2468226" cy="2457256"/>
+            <a:off x="9170865" y="2784357"/>
+            <a:ext cx="2013844" cy="2004893"/>
           </a:xfrm>
           <a:prstGeom prst="rect">
             <a:avLst/>
@@ -3579,55 +3579,8 @@
         </p:blipFill>
         <p:spPr bwMode="auto">
           <a:xfrm>
-            <a:off x="2891922" y="393934"/>
-            <a:ext cx="3118432" cy="2244897"/>
-          </a:xfrm>
-          <a:prstGeom prst="rect">
-            <a:avLst/>
-          </a:prstGeom>
-          <a:noFill/>
-          <a:extLst>
-            <a:ext uri="{909E8E84-426E-40DD-AFC4-6F175D3DCCD1}">
-              <a14:hiddenFill xmlns:a14="http://schemas.microsoft.com/office/drawing/2010/main">
-                <a:solidFill>
-                  <a:srgbClr val="FFFFFF"/>
-                </a:solidFill>
-              </a14:hiddenFill>
-            </a:ext>
-          </a:extLst>
-        </p:spPr>
-      </p:pic>
-      <p:pic>
-        <p:nvPicPr>
-          <p:cNvPr id="1038" name="Picture 14" descr="Administración de Parques Nacionales - Wikipedia">
-            <a:extLst>
-              <a:ext uri="{FF2B5EF4-FFF2-40B4-BE49-F238E27FC236}">
-                <a16:creationId xmlns:a16="http://schemas.microsoft.com/office/drawing/2014/main" id="{7C438743-15A0-40F9-9942-894FA0EF9107}"/>
-              </a:ext>
-            </a:extLst>
-          </p:cNvPr>
-          <p:cNvPicPr>
-            <a:picLocks noChangeAspect="1" noChangeArrowheads="1"/>
-          </p:cNvPicPr>
-          <p:nvPr/>
-        </p:nvPicPr>
-        <p:blipFill>
-          <a:blip r:embed="rId8">
-            <a:extLst>
-              <a:ext uri="{28A0092B-C50C-407E-A947-70E740481C1C}">
-                <a14:useLocalDpi xmlns:a14="http://schemas.microsoft.com/office/drawing/2010/main" val="0"/>
-              </a:ext>
-            </a:extLst>
-          </a:blip>
-          <a:srcRect/>
-          <a:stretch>
-            <a:fillRect/>
-          </a:stretch>
-        </p:blipFill>
-        <p:spPr bwMode="auto">
-          <a:xfrm>
-            <a:off x="6181648" y="425181"/>
-            <a:ext cx="2182402" cy="2182402"/>
+            <a:off x="2370564" y="329636"/>
+            <a:ext cx="2424594" cy="1745417"/>
           </a:xfrm>
           <a:prstGeom prst="rect">
             <a:avLst/>
@@ -3659,7 +3612,7 @@
           <p:nvPr/>
         </p:nvPicPr>
         <p:blipFill>
-          <a:blip r:embed="rId9">
+          <a:blip r:embed="rId8">
             <a:extLst>
               <a:ext uri="{28A0092B-C50C-407E-A947-70E740481C1C}">
                 <a14:useLocalDpi xmlns:a14="http://schemas.microsoft.com/office/drawing/2010/main" val="0"/>
@@ -3672,8 +3625,80 @@
         </p:blipFill>
         <p:spPr>
           <a:xfrm>
-            <a:off x="3582861" y="5688320"/>
+            <a:off x="4627145" y="5428478"/>
             <a:ext cx="5550642" cy="955583"/>
+          </a:xfrm>
+          <a:prstGeom prst="rect">
+            <a:avLst/>
+          </a:prstGeom>
+        </p:spPr>
+      </p:pic>
+      <p:pic>
+        <p:nvPicPr>
+          <p:cNvPr id="5" name="Picture 4" descr="Logo&#10;&#10;Description automatically generated">
+            <a:extLst>
+              <a:ext uri="{FF2B5EF4-FFF2-40B4-BE49-F238E27FC236}">
+                <a16:creationId xmlns:a16="http://schemas.microsoft.com/office/drawing/2014/main" id="{A163CB0F-BBEA-C17F-113D-2D88713930FE}"/>
+              </a:ext>
+            </a:extLst>
+          </p:cNvPr>
+          <p:cNvPicPr>
+            <a:picLocks noChangeAspect="1"/>
+          </p:cNvPicPr>
+          <p:nvPr/>
+        </p:nvPicPr>
+        <p:blipFill>
+          <a:blip r:embed="rId9">
+            <a:extLst>
+              <a:ext uri="{28A0092B-C50C-407E-A947-70E740481C1C}">
+                <a14:useLocalDpi xmlns:a14="http://schemas.microsoft.com/office/drawing/2010/main" val="0"/>
+              </a:ext>
+            </a:extLst>
+          </a:blip>
+          <a:stretch>
+            <a:fillRect/>
+          </a:stretch>
+        </p:blipFill>
+        <p:spPr>
+          <a:xfrm>
+            <a:off x="8174534" y="560691"/>
+            <a:ext cx="3544854" cy="1224924"/>
+          </a:xfrm>
+          <a:prstGeom prst="rect">
+            <a:avLst/>
+          </a:prstGeom>
+        </p:spPr>
+      </p:pic>
+      <p:pic>
+        <p:nvPicPr>
+          <p:cNvPr id="8" name="Picture 7" descr="Logo&#10;&#10;Description automatically generated">
+            <a:extLst>
+              <a:ext uri="{FF2B5EF4-FFF2-40B4-BE49-F238E27FC236}">
+                <a16:creationId xmlns:a16="http://schemas.microsoft.com/office/drawing/2014/main" id="{BBFA0F11-8252-C24E-4C2E-2E3B28EB628C}"/>
+              </a:ext>
+            </a:extLst>
+          </p:cNvPr>
+          <p:cNvPicPr>
+            <a:picLocks noChangeAspect="1"/>
+          </p:cNvPicPr>
+          <p:nvPr/>
+        </p:nvPicPr>
+        <p:blipFill>
+          <a:blip r:embed="rId10">
+            <a:extLst>
+              <a:ext uri="{28A0092B-C50C-407E-A947-70E740481C1C}">
+                <a14:useLocalDpi xmlns:a14="http://schemas.microsoft.com/office/drawing/2010/main" val="0"/>
+              </a:ext>
+            </a:extLst>
+          </a:blip>
+          <a:stretch>
+            <a:fillRect/>
+          </a:stretch>
+        </p:blipFill>
+        <p:spPr>
+          <a:xfrm>
+            <a:off x="3688372" y="2784357"/>
+            <a:ext cx="4815255" cy="1934817"/>
           </a:xfrm>
           <a:prstGeom prst="rect">
             <a:avLst/>

</xml_diff>

<commit_message>
made editorial changes and embedded html files
</commit_message>
<xml_diff>
--- a/docs/images/sponsors.pptx
+++ b/docs/images/sponsors.pptx
@@ -3438,7 +3438,7 @@
         </p:blipFill>
         <p:spPr bwMode="auto">
           <a:xfrm>
-            <a:off x="0" y="2552377"/>
+            <a:off x="-770486" y="2585099"/>
             <a:ext cx="4221916" cy="2110958"/>
           </a:xfrm>
           <a:prstGeom prst="rect">
@@ -3532,7 +3532,7 @@
         </p:blipFill>
         <p:spPr bwMode="auto">
           <a:xfrm>
-            <a:off x="9170865" y="2784357"/>
+            <a:off x="9946961" y="2661939"/>
             <a:ext cx="2013844" cy="2004893"/>
           </a:xfrm>
           <a:prstGeom prst="rect">
@@ -3661,8 +3661,8 @@
         </p:blipFill>
         <p:spPr>
           <a:xfrm>
-            <a:off x="8174534" y="560691"/>
-            <a:ext cx="3544854" cy="1224924"/>
+            <a:off x="7978487" y="358827"/>
+            <a:ext cx="4213513" cy="1455979"/>
           </a:xfrm>
           <a:prstGeom prst="rect">
             <a:avLst/>
@@ -3697,8 +3697,44 @@
         </p:blipFill>
         <p:spPr>
           <a:xfrm>
-            <a:off x="3688372" y="2784357"/>
+            <a:off x="2387530" y="2661939"/>
             <a:ext cx="4815255" cy="1934817"/>
+          </a:xfrm>
+          <a:prstGeom prst="rect">
+            <a:avLst/>
+          </a:prstGeom>
+        </p:spPr>
+      </p:pic>
+      <p:pic>
+        <p:nvPicPr>
+          <p:cNvPr id="6" name="Picture 5" descr="Logo&#10;&#10;Description automatically generated">
+            <a:extLst>
+              <a:ext uri="{FF2B5EF4-FFF2-40B4-BE49-F238E27FC236}">
+                <a16:creationId xmlns:a16="http://schemas.microsoft.com/office/drawing/2014/main" id="{75404B2A-7190-02E0-89D5-F8CC0FC26F1D}"/>
+              </a:ext>
+            </a:extLst>
+          </p:cNvPr>
+          <p:cNvPicPr>
+            <a:picLocks noChangeAspect="1"/>
+          </p:cNvPicPr>
+          <p:nvPr/>
+        </p:nvPicPr>
+        <p:blipFill>
+          <a:blip r:embed="rId11">
+            <a:extLst>
+              <a:ext uri="{28A0092B-C50C-407E-A947-70E740481C1C}">
+                <a14:useLocalDpi xmlns:a14="http://schemas.microsoft.com/office/drawing/2010/main" val="0"/>
+              </a:ext>
+            </a:extLst>
+          </a:blip>
+          <a:stretch>
+            <a:fillRect/>
+          </a:stretch>
+        </p:blipFill>
+        <p:spPr>
+          <a:xfrm>
+            <a:off x="7067293" y="2032495"/>
+            <a:ext cx="3015160" cy="3015160"/>
           </a:xfrm>
           <a:prstGeom prst="rect">
             <a:avLst/>

</xml_diff>